<commit_message>
fix icon absolute position to list background img
</commit_message>
<xml_diff>
--- a/img/아이콘작업.pptx
+++ b/img/아이콘작업.pptx
@@ -6,6 +6,7 @@
   </p:sldMasterIdLst>
   <p:sldIdLst>
     <p:sldId id="256" r:id="rId2"/>
+    <p:sldId id="257" r:id="rId3"/>
   </p:sldIdLst>
   <p:sldSz cx="12192000" cy="6858000"/>
   <p:notesSz cx="6858000" cy="9144000"/>
@@ -104,6 +105,11 @@
       </a:defRPr>
     </a:lvl9pPr>
   </p:defaultTextStyle>
+  <p:extLst>
+    <p:ext uri="{EFAFB233-063F-42B5-8137-9DF3F51BA10A}">
+      <p15:sldGuideLst xmlns:p15="http://schemas.microsoft.com/office/powerpoint/2012/main"/>
+    </p:ext>
+  </p:extLst>
 </p:presentation>
 </file>
 
@@ -3818,6 +3824,883 @@
 </p:sld>
 </file>
 
+<file path=ppt/slides/slide2.xml><?xml version="1.0" encoding="utf-8"?>
+<p:sld xmlns:a="http://schemas.openxmlformats.org/drawingml/2006/main" xmlns:r="http://schemas.openxmlformats.org/officeDocument/2006/relationships" xmlns:p="http://schemas.openxmlformats.org/presentationml/2006/main">
+  <p:cSld>
+    <p:spTree>
+      <p:nvGrpSpPr>
+        <p:cNvPr id="1" name=""/>
+        <p:cNvGrpSpPr/>
+        <p:nvPr/>
+      </p:nvGrpSpPr>
+      <p:grpSpPr>
+        <a:xfrm>
+          <a:off x="0" y="0"/>
+          <a:ext cx="0" cy="0"/>
+          <a:chOff x="0" y="0"/>
+          <a:chExt cx="0" cy="0"/>
+        </a:xfrm>
+      </p:grpSpPr>
+      <p:grpSp>
+        <p:nvGrpSpPr>
+          <p:cNvPr id="13" name="그룹 12">
+            <a:extLst>
+              <a:ext uri="{FF2B5EF4-FFF2-40B4-BE49-F238E27FC236}">
+                <a16:creationId xmlns:a16="http://schemas.microsoft.com/office/drawing/2014/main" id="{1C630270-C665-4960-831C-250F251C894A}"/>
+              </a:ext>
+            </a:extLst>
+          </p:cNvPr>
+          <p:cNvGrpSpPr/>
+          <p:nvPr/>
+        </p:nvGrpSpPr>
+        <p:grpSpPr>
+          <a:xfrm>
+            <a:off x="392152" y="1003610"/>
+            <a:ext cx="550231" cy="542611"/>
+            <a:chOff x="903249" y="1003610"/>
+            <a:chExt cx="2397257" cy="2364058"/>
+          </a:xfrm>
+        </p:grpSpPr>
+        <p:sp>
+          <p:nvSpPr>
+            <p:cNvPr id="4" name="타원 3">
+              <a:extLst>
+                <a:ext uri="{FF2B5EF4-FFF2-40B4-BE49-F238E27FC236}">
+                  <a16:creationId xmlns:a16="http://schemas.microsoft.com/office/drawing/2014/main" id="{349E20A6-04EB-46CB-AF66-1554EC980778}"/>
+                </a:ext>
+              </a:extLst>
+            </p:cNvPr>
+            <p:cNvSpPr/>
+            <p:nvPr/>
+          </p:nvSpPr>
+          <p:spPr>
+            <a:xfrm>
+              <a:off x="903249" y="1003610"/>
+              <a:ext cx="2364058" cy="2364058"/>
+            </a:xfrm>
+            <a:prstGeom prst="ellipse">
+              <a:avLst/>
+            </a:prstGeom>
+            <a:solidFill>
+              <a:srgbClr val="6CA644"/>
+            </a:solidFill>
+            <a:ln>
+              <a:noFill/>
+            </a:ln>
+          </p:spPr>
+          <p:style>
+            <a:lnRef idx="2">
+              <a:schemeClr val="accent1">
+                <a:shade val="50000"/>
+              </a:schemeClr>
+            </a:lnRef>
+            <a:fillRef idx="1">
+              <a:schemeClr val="accent1"/>
+            </a:fillRef>
+            <a:effectRef idx="0">
+              <a:schemeClr val="accent1"/>
+            </a:effectRef>
+            <a:fontRef idx="minor">
+              <a:schemeClr val="lt1"/>
+            </a:fontRef>
+          </p:style>
+          <p:txBody>
+            <a:bodyPr rtlCol="0" anchor="ctr"/>
+            <a:lstStyle/>
+            <a:p>
+              <a:pPr algn="ctr"/>
+              <a:endParaRPr lang="ko-KR" altLang="en-US"/>
+            </a:p>
+          </p:txBody>
+        </p:sp>
+        <p:sp>
+          <p:nvSpPr>
+            <p:cNvPr id="9" name="TextBox 8">
+              <a:extLst>
+                <a:ext uri="{FF2B5EF4-FFF2-40B4-BE49-F238E27FC236}">
+                  <a16:creationId xmlns:a16="http://schemas.microsoft.com/office/drawing/2014/main" id="{AD4BDCBA-B435-4E49-ADC1-B306ABBD8E5C}"/>
+                </a:ext>
+              </a:extLst>
+            </p:cNvPr>
+            <p:cNvSpPr txBox="1"/>
+            <p:nvPr/>
+          </p:nvSpPr>
+          <p:spPr>
+            <a:xfrm>
+              <a:off x="936448" y="1514525"/>
+              <a:ext cx="2364058" cy="1475019"/>
+            </a:xfrm>
+            <a:prstGeom prst="rect">
+              <a:avLst/>
+            </a:prstGeom>
+            <a:noFill/>
+          </p:spPr>
+          <p:txBody>
+            <a:bodyPr wrap="square" rtlCol="0">
+              <a:spAutoFit/>
+            </a:bodyPr>
+            <a:lstStyle/>
+            <a:p>
+              <a:r>
+                <a:rPr lang="en-US" altLang="ko-KR" sz="1600" b="1" dirty="0">
+                  <a:solidFill>
+                    <a:schemeClr val="bg1"/>
+                  </a:solidFill>
+                  <a:latin typeface="넥슨 풋볼고딕 B" panose="020B0803000000000000" pitchFamily="50" charset="-127"/>
+                  <a:ea typeface="넥슨 풋볼고딕 B" panose="020B0803000000000000" pitchFamily="50" charset="-127"/>
+                </a:rPr>
+                <a:t>ALL</a:t>
+              </a:r>
+              <a:endParaRPr lang="ko-KR" altLang="en-US" sz="1600" b="1" dirty="0">
+                <a:solidFill>
+                  <a:schemeClr val="bg1"/>
+                </a:solidFill>
+                <a:latin typeface="넥슨 풋볼고딕 B" panose="020B0803000000000000" pitchFamily="50" charset="-127"/>
+                <a:ea typeface="넥슨 풋볼고딕 B" panose="020B0803000000000000" pitchFamily="50" charset="-127"/>
+              </a:endParaRPr>
+            </a:p>
+          </p:txBody>
+        </p:sp>
+      </p:grpSp>
+      <p:grpSp>
+        <p:nvGrpSpPr>
+          <p:cNvPr id="14" name="그룹 13">
+            <a:extLst>
+              <a:ext uri="{FF2B5EF4-FFF2-40B4-BE49-F238E27FC236}">
+                <a16:creationId xmlns:a16="http://schemas.microsoft.com/office/drawing/2014/main" id="{4F158110-05B6-40C6-A203-D04503121B2C}"/>
+              </a:ext>
+            </a:extLst>
+          </p:cNvPr>
+          <p:cNvGrpSpPr/>
+          <p:nvPr/>
+        </p:nvGrpSpPr>
+        <p:grpSpPr>
+          <a:xfrm>
+            <a:off x="3185532" y="1003610"/>
+            <a:ext cx="2404946" cy="2364058"/>
+            <a:chOff x="4014439" y="1003610"/>
+            <a:chExt cx="2404946" cy="2364058"/>
+          </a:xfrm>
+        </p:grpSpPr>
+        <p:sp>
+          <p:nvSpPr>
+            <p:cNvPr id="5" name="타원 4">
+              <a:extLst>
+                <a:ext uri="{FF2B5EF4-FFF2-40B4-BE49-F238E27FC236}">
+                  <a16:creationId xmlns:a16="http://schemas.microsoft.com/office/drawing/2014/main" id="{D147A76B-DE3A-4FB3-BA0E-1E6EDD7A14E8}"/>
+                </a:ext>
+              </a:extLst>
+            </p:cNvPr>
+            <p:cNvSpPr/>
+            <p:nvPr/>
+          </p:nvSpPr>
+          <p:spPr>
+            <a:xfrm>
+              <a:off x="4014439" y="1003610"/>
+              <a:ext cx="2364058" cy="2364058"/>
+            </a:xfrm>
+            <a:prstGeom prst="ellipse">
+              <a:avLst/>
+            </a:prstGeom>
+            <a:solidFill>
+              <a:srgbClr val="0996ED"/>
+            </a:solidFill>
+            <a:ln>
+              <a:noFill/>
+            </a:ln>
+          </p:spPr>
+          <p:style>
+            <a:lnRef idx="2">
+              <a:schemeClr val="accent1">
+                <a:shade val="50000"/>
+              </a:schemeClr>
+            </a:lnRef>
+            <a:fillRef idx="1">
+              <a:schemeClr val="accent1"/>
+            </a:fillRef>
+            <a:effectRef idx="0">
+              <a:schemeClr val="accent1"/>
+            </a:effectRef>
+            <a:fontRef idx="minor">
+              <a:schemeClr val="lt1"/>
+            </a:fontRef>
+          </p:style>
+          <p:txBody>
+            <a:bodyPr rtlCol="0" anchor="ctr"/>
+            <a:lstStyle/>
+            <a:p>
+              <a:pPr algn="ctr"/>
+              <a:endParaRPr lang="ko-KR" altLang="en-US"/>
+            </a:p>
+          </p:txBody>
+        </p:sp>
+        <p:sp>
+          <p:nvSpPr>
+            <p:cNvPr id="10" name="TextBox 9">
+              <a:extLst>
+                <a:ext uri="{FF2B5EF4-FFF2-40B4-BE49-F238E27FC236}">
+                  <a16:creationId xmlns:a16="http://schemas.microsoft.com/office/drawing/2014/main" id="{6AE7DE2D-5642-4B2C-9911-B2AB368A2B1F}"/>
+                </a:ext>
+              </a:extLst>
+            </p:cNvPr>
+            <p:cNvSpPr txBox="1"/>
+            <p:nvPr/>
+          </p:nvSpPr>
+          <p:spPr>
+            <a:xfrm>
+              <a:off x="4506951" y="1546221"/>
+              <a:ext cx="1912434" cy="1323439"/>
+            </a:xfrm>
+            <a:prstGeom prst="rect">
+              <a:avLst/>
+            </a:prstGeom>
+            <a:noFill/>
+          </p:spPr>
+          <p:txBody>
+            <a:bodyPr wrap="square" rtlCol="0">
+              <a:spAutoFit/>
+            </a:bodyPr>
+            <a:lstStyle/>
+            <a:p>
+              <a:r>
+                <a:rPr lang="en-US" altLang="ko-KR" sz="8000" b="1" dirty="0">
+                  <a:solidFill>
+                    <a:schemeClr val="bg1"/>
+                  </a:solidFill>
+                  <a:latin typeface="넥슨 풋볼고딕 B" panose="020B0803000000000000" pitchFamily="50" charset="-127"/>
+                  <a:ea typeface="넥슨 풋볼고딕 B" panose="020B0803000000000000" pitchFamily="50" charset="-127"/>
+                </a:rPr>
+                <a:t>12</a:t>
+              </a:r>
+              <a:endParaRPr lang="ko-KR" altLang="en-US" sz="8000" b="1" dirty="0">
+                <a:solidFill>
+                  <a:schemeClr val="bg1"/>
+                </a:solidFill>
+                <a:latin typeface="넥슨 풋볼고딕 B" panose="020B0803000000000000" pitchFamily="50" charset="-127"/>
+                <a:ea typeface="넥슨 풋볼고딕 B" panose="020B0803000000000000" pitchFamily="50" charset="-127"/>
+              </a:endParaRPr>
+            </a:p>
+          </p:txBody>
+        </p:sp>
+      </p:grpSp>
+      <p:grpSp>
+        <p:nvGrpSpPr>
+          <p:cNvPr id="15" name="그룹 14">
+            <a:extLst>
+              <a:ext uri="{FF2B5EF4-FFF2-40B4-BE49-F238E27FC236}">
+                <a16:creationId xmlns:a16="http://schemas.microsoft.com/office/drawing/2014/main" id="{084CCB7D-A955-429C-94E9-0034A45B4103}"/>
+              </a:ext>
+            </a:extLst>
+          </p:cNvPr>
+          <p:cNvGrpSpPr/>
+          <p:nvPr/>
+        </p:nvGrpSpPr>
+        <p:grpSpPr>
+          <a:xfrm>
+            <a:off x="6042102" y="1003610"/>
+            <a:ext cx="2364058" cy="2364058"/>
+            <a:chOff x="7515922" y="1003610"/>
+            <a:chExt cx="2364058" cy="2364058"/>
+          </a:xfrm>
+        </p:grpSpPr>
+        <p:sp>
+          <p:nvSpPr>
+            <p:cNvPr id="6" name="타원 5">
+              <a:extLst>
+                <a:ext uri="{FF2B5EF4-FFF2-40B4-BE49-F238E27FC236}">
+                  <a16:creationId xmlns:a16="http://schemas.microsoft.com/office/drawing/2014/main" id="{B9110D50-11B2-467B-920C-F2A0B7EEBA8F}"/>
+                </a:ext>
+              </a:extLst>
+            </p:cNvPr>
+            <p:cNvSpPr/>
+            <p:nvPr/>
+          </p:nvSpPr>
+          <p:spPr>
+            <a:xfrm>
+              <a:off x="7515922" y="1003610"/>
+              <a:ext cx="2364058" cy="2364058"/>
+            </a:xfrm>
+            <a:prstGeom prst="ellipse">
+              <a:avLst/>
+            </a:prstGeom>
+            <a:solidFill>
+              <a:srgbClr val="CC0000"/>
+            </a:solidFill>
+            <a:ln>
+              <a:noFill/>
+            </a:ln>
+          </p:spPr>
+          <p:style>
+            <a:lnRef idx="2">
+              <a:schemeClr val="accent1">
+                <a:shade val="50000"/>
+              </a:schemeClr>
+            </a:lnRef>
+            <a:fillRef idx="1">
+              <a:schemeClr val="accent1"/>
+            </a:fillRef>
+            <a:effectRef idx="0">
+              <a:schemeClr val="accent1"/>
+            </a:effectRef>
+            <a:fontRef idx="minor">
+              <a:schemeClr val="lt1"/>
+            </a:fontRef>
+          </p:style>
+          <p:txBody>
+            <a:bodyPr rtlCol="0" anchor="ctr"/>
+            <a:lstStyle/>
+            <a:p>
+              <a:pPr algn="ctr"/>
+              <a:endParaRPr lang="ko-KR" altLang="en-US"/>
+            </a:p>
+          </p:txBody>
+        </p:sp>
+        <p:sp>
+          <p:nvSpPr>
+            <p:cNvPr id="11" name="TextBox 10">
+              <a:extLst>
+                <a:ext uri="{FF2B5EF4-FFF2-40B4-BE49-F238E27FC236}">
+                  <a16:creationId xmlns:a16="http://schemas.microsoft.com/office/drawing/2014/main" id="{94A89FDD-2191-4EF0-BE98-857AD5113882}"/>
+                </a:ext>
+              </a:extLst>
+            </p:cNvPr>
+            <p:cNvSpPr txBox="1"/>
+            <p:nvPr/>
+          </p:nvSpPr>
+          <p:spPr>
+            <a:xfrm>
+              <a:off x="7967546" y="1546221"/>
+              <a:ext cx="1912434" cy="1323439"/>
+            </a:xfrm>
+            <a:prstGeom prst="rect">
+              <a:avLst/>
+            </a:prstGeom>
+            <a:noFill/>
+          </p:spPr>
+          <p:txBody>
+            <a:bodyPr wrap="square" rtlCol="0">
+              <a:spAutoFit/>
+            </a:bodyPr>
+            <a:lstStyle/>
+            <a:p>
+              <a:r>
+                <a:rPr lang="en-US" altLang="ko-KR" sz="8000" b="1" dirty="0">
+                  <a:solidFill>
+                    <a:schemeClr val="bg1"/>
+                  </a:solidFill>
+                  <a:latin typeface="넥슨 풋볼고딕 B" panose="020B0803000000000000" pitchFamily="50" charset="-127"/>
+                  <a:ea typeface="넥슨 풋볼고딕 B" panose="020B0803000000000000" pitchFamily="50" charset="-127"/>
+                </a:rPr>
+                <a:t>19</a:t>
+              </a:r>
+              <a:endParaRPr lang="ko-KR" altLang="en-US" sz="8000" b="1" dirty="0">
+                <a:solidFill>
+                  <a:schemeClr val="bg1"/>
+                </a:solidFill>
+                <a:latin typeface="넥슨 풋볼고딕 B" panose="020B0803000000000000" pitchFamily="50" charset="-127"/>
+                <a:ea typeface="넥슨 풋볼고딕 B" panose="020B0803000000000000" pitchFamily="50" charset="-127"/>
+              </a:endParaRPr>
+            </a:p>
+          </p:txBody>
+        </p:sp>
+      </p:grpSp>
+      <p:grpSp>
+        <p:nvGrpSpPr>
+          <p:cNvPr id="16" name="그룹 15">
+            <a:extLst>
+              <a:ext uri="{FF2B5EF4-FFF2-40B4-BE49-F238E27FC236}">
+                <a16:creationId xmlns:a16="http://schemas.microsoft.com/office/drawing/2014/main" id="{625C2AE2-E7E9-4997-81F3-43DFC12C50D6}"/>
+              </a:ext>
+            </a:extLst>
+          </p:cNvPr>
+          <p:cNvGrpSpPr/>
+          <p:nvPr/>
+        </p:nvGrpSpPr>
+        <p:grpSpPr>
+          <a:xfrm>
+            <a:off x="8995317" y="1003610"/>
+            <a:ext cx="2364058" cy="2364058"/>
+            <a:chOff x="8995317" y="1003610"/>
+            <a:chExt cx="2364058" cy="2364058"/>
+          </a:xfrm>
+        </p:grpSpPr>
+        <p:sp>
+          <p:nvSpPr>
+            <p:cNvPr id="7" name="타원 6">
+              <a:extLst>
+                <a:ext uri="{FF2B5EF4-FFF2-40B4-BE49-F238E27FC236}">
+                  <a16:creationId xmlns:a16="http://schemas.microsoft.com/office/drawing/2014/main" id="{CFAF69BE-23CA-4208-AB9B-447D6BC9E653}"/>
+                </a:ext>
+              </a:extLst>
+            </p:cNvPr>
+            <p:cNvSpPr/>
+            <p:nvPr/>
+          </p:nvSpPr>
+          <p:spPr>
+            <a:xfrm>
+              <a:off x="8995317" y="1003610"/>
+              <a:ext cx="2364058" cy="2364058"/>
+            </a:xfrm>
+            <a:prstGeom prst="ellipse">
+              <a:avLst/>
+            </a:prstGeom>
+            <a:solidFill>
+              <a:srgbClr val="F4A310"/>
+            </a:solidFill>
+            <a:ln>
+              <a:noFill/>
+            </a:ln>
+          </p:spPr>
+          <p:style>
+            <a:lnRef idx="2">
+              <a:schemeClr val="accent1">
+                <a:shade val="50000"/>
+              </a:schemeClr>
+            </a:lnRef>
+            <a:fillRef idx="1">
+              <a:schemeClr val="accent1"/>
+            </a:fillRef>
+            <a:effectRef idx="0">
+              <a:schemeClr val="accent1"/>
+            </a:effectRef>
+            <a:fontRef idx="minor">
+              <a:schemeClr val="lt1"/>
+            </a:fontRef>
+          </p:style>
+          <p:txBody>
+            <a:bodyPr rtlCol="0" anchor="ctr"/>
+            <a:lstStyle/>
+            <a:p>
+              <a:pPr algn="ctr"/>
+              <a:endParaRPr lang="ko-KR" altLang="en-US"/>
+            </a:p>
+          </p:txBody>
+        </p:sp>
+        <p:sp>
+          <p:nvSpPr>
+            <p:cNvPr id="12" name="TextBox 11">
+              <a:extLst>
+                <a:ext uri="{FF2B5EF4-FFF2-40B4-BE49-F238E27FC236}">
+                  <a16:creationId xmlns:a16="http://schemas.microsoft.com/office/drawing/2014/main" id="{A9FE2022-9C1D-4315-B08B-17C820AB8114}"/>
+                </a:ext>
+              </a:extLst>
+            </p:cNvPr>
+            <p:cNvSpPr txBox="1"/>
+            <p:nvPr/>
+          </p:nvSpPr>
+          <p:spPr>
+            <a:xfrm>
+              <a:off x="9446941" y="1546221"/>
+              <a:ext cx="1912434" cy="1323439"/>
+            </a:xfrm>
+            <a:prstGeom prst="rect">
+              <a:avLst/>
+            </a:prstGeom>
+            <a:noFill/>
+          </p:spPr>
+          <p:txBody>
+            <a:bodyPr wrap="square" rtlCol="0">
+              <a:spAutoFit/>
+            </a:bodyPr>
+            <a:lstStyle/>
+            <a:p>
+              <a:r>
+                <a:rPr lang="en-US" altLang="ko-KR" sz="8000" b="1" dirty="0">
+                  <a:solidFill>
+                    <a:schemeClr val="bg1"/>
+                  </a:solidFill>
+                  <a:latin typeface="넥슨 풋볼고딕 B" panose="020B0803000000000000" pitchFamily="50" charset="-127"/>
+                  <a:ea typeface="넥슨 풋볼고딕 B" panose="020B0803000000000000" pitchFamily="50" charset="-127"/>
+                </a:rPr>
+                <a:t>15</a:t>
+              </a:r>
+              <a:endParaRPr lang="ko-KR" altLang="en-US" sz="8000" b="1" dirty="0">
+                <a:solidFill>
+                  <a:schemeClr val="bg1"/>
+                </a:solidFill>
+                <a:latin typeface="넥슨 풋볼고딕 B" panose="020B0803000000000000" pitchFamily="50" charset="-127"/>
+                <a:ea typeface="넥슨 풋볼고딕 B" panose="020B0803000000000000" pitchFamily="50" charset="-127"/>
+              </a:endParaRPr>
+            </a:p>
+          </p:txBody>
+        </p:sp>
+      </p:grpSp>
+      <p:grpSp>
+        <p:nvGrpSpPr>
+          <p:cNvPr id="17" name="그룹 16">
+            <a:extLst>
+              <a:ext uri="{FF2B5EF4-FFF2-40B4-BE49-F238E27FC236}">
+                <a16:creationId xmlns:a16="http://schemas.microsoft.com/office/drawing/2014/main" id="{4716AD25-FAEC-41CC-8C40-8F1A80E0F226}"/>
+              </a:ext>
+            </a:extLst>
+          </p:cNvPr>
+          <p:cNvGrpSpPr/>
+          <p:nvPr/>
+        </p:nvGrpSpPr>
+        <p:grpSpPr>
+          <a:xfrm>
+            <a:off x="1291312" y="1003610"/>
+            <a:ext cx="565471" cy="542611"/>
+            <a:chOff x="903249" y="1003610"/>
+            <a:chExt cx="2463655" cy="2364058"/>
+          </a:xfrm>
+        </p:grpSpPr>
+        <p:sp>
+          <p:nvSpPr>
+            <p:cNvPr id="18" name="타원 17">
+              <a:extLst>
+                <a:ext uri="{FF2B5EF4-FFF2-40B4-BE49-F238E27FC236}">
+                  <a16:creationId xmlns:a16="http://schemas.microsoft.com/office/drawing/2014/main" id="{F6CD92E3-97DA-4984-BD2E-A1AF0197CD40}"/>
+                </a:ext>
+              </a:extLst>
+            </p:cNvPr>
+            <p:cNvSpPr/>
+            <p:nvPr/>
+          </p:nvSpPr>
+          <p:spPr>
+            <a:xfrm>
+              <a:off x="903249" y="1003610"/>
+              <a:ext cx="2364058" cy="2364058"/>
+            </a:xfrm>
+            <a:prstGeom prst="ellipse">
+              <a:avLst/>
+            </a:prstGeom>
+            <a:solidFill>
+              <a:srgbClr val="0996ED"/>
+            </a:solidFill>
+            <a:ln>
+              <a:noFill/>
+            </a:ln>
+          </p:spPr>
+          <p:style>
+            <a:lnRef idx="2">
+              <a:schemeClr val="accent1">
+                <a:shade val="50000"/>
+              </a:schemeClr>
+            </a:lnRef>
+            <a:fillRef idx="1">
+              <a:schemeClr val="accent1"/>
+            </a:fillRef>
+            <a:effectRef idx="0">
+              <a:schemeClr val="accent1"/>
+            </a:effectRef>
+            <a:fontRef idx="minor">
+              <a:schemeClr val="lt1"/>
+            </a:fontRef>
+          </p:style>
+          <p:txBody>
+            <a:bodyPr rtlCol="0" anchor="ctr"/>
+            <a:lstStyle/>
+            <a:p>
+              <a:pPr algn="ctr"/>
+              <a:endParaRPr lang="ko-KR" altLang="en-US"/>
+            </a:p>
+          </p:txBody>
+        </p:sp>
+        <p:sp>
+          <p:nvSpPr>
+            <p:cNvPr id="19" name="TextBox 18">
+              <a:extLst>
+                <a:ext uri="{FF2B5EF4-FFF2-40B4-BE49-F238E27FC236}">
+                  <a16:creationId xmlns:a16="http://schemas.microsoft.com/office/drawing/2014/main" id="{D1BC6FCA-EA03-4BAE-BBC0-BEE7B798726A}"/>
+                </a:ext>
+              </a:extLst>
+            </p:cNvPr>
+            <p:cNvSpPr txBox="1"/>
+            <p:nvPr/>
+          </p:nvSpPr>
+          <p:spPr>
+            <a:xfrm>
+              <a:off x="1002846" y="1414929"/>
+              <a:ext cx="2364058" cy="1743207"/>
+            </a:xfrm>
+            <a:prstGeom prst="rect">
+              <a:avLst/>
+            </a:prstGeom>
+            <a:noFill/>
+          </p:spPr>
+          <p:txBody>
+            <a:bodyPr wrap="square" rtlCol="0">
+              <a:spAutoFit/>
+            </a:bodyPr>
+            <a:lstStyle/>
+            <a:p>
+              <a:r>
+                <a:rPr lang="en-US" altLang="ko-KR" sz="2000" b="1" dirty="0">
+                  <a:solidFill>
+                    <a:schemeClr val="bg1"/>
+                  </a:solidFill>
+                  <a:latin typeface="넥슨 풋볼고딕 B" panose="020B0803000000000000" pitchFamily="50" charset="-127"/>
+                  <a:ea typeface="넥슨 풋볼고딕 B" panose="020B0803000000000000" pitchFamily="50" charset="-127"/>
+                </a:rPr>
+                <a:t>12</a:t>
+              </a:r>
+              <a:endParaRPr lang="ko-KR" altLang="en-US" sz="2000" b="1" dirty="0">
+                <a:solidFill>
+                  <a:schemeClr val="bg1"/>
+                </a:solidFill>
+                <a:latin typeface="넥슨 풋볼고딕 B" panose="020B0803000000000000" pitchFamily="50" charset="-127"/>
+                <a:ea typeface="넥슨 풋볼고딕 B" panose="020B0803000000000000" pitchFamily="50" charset="-127"/>
+              </a:endParaRPr>
+            </a:p>
+          </p:txBody>
+        </p:sp>
+      </p:grpSp>
+      <p:grpSp>
+        <p:nvGrpSpPr>
+          <p:cNvPr id="20" name="그룹 19">
+            <a:extLst>
+              <a:ext uri="{FF2B5EF4-FFF2-40B4-BE49-F238E27FC236}">
+                <a16:creationId xmlns:a16="http://schemas.microsoft.com/office/drawing/2014/main" id="{ACA41E5F-B451-4E2E-A44F-80187F120C86}"/>
+              </a:ext>
+            </a:extLst>
+          </p:cNvPr>
+          <p:cNvGrpSpPr/>
+          <p:nvPr/>
+        </p:nvGrpSpPr>
+        <p:grpSpPr>
+          <a:xfrm>
+            <a:off x="2042747" y="1264283"/>
+            <a:ext cx="565471" cy="542611"/>
+            <a:chOff x="903249" y="1003610"/>
+            <a:chExt cx="2463655" cy="2364058"/>
+          </a:xfrm>
+        </p:grpSpPr>
+        <p:sp>
+          <p:nvSpPr>
+            <p:cNvPr id="21" name="타원 20">
+              <a:extLst>
+                <a:ext uri="{FF2B5EF4-FFF2-40B4-BE49-F238E27FC236}">
+                  <a16:creationId xmlns:a16="http://schemas.microsoft.com/office/drawing/2014/main" id="{DF4938EB-C1B5-4E58-A0EB-B22F6332AE66}"/>
+                </a:ext>
+              </a:extLst>
+            </p:cNvPr>
+            <p:cNvSpPr/>
+            <p:nvPr/>
+          </p:nvSpPr>
+          <p:spPr>
+            <a:xfrm>
+              <a:off x="903249" y="1003610"/>
+              <a:ext cx="2364058" cy="2364058"/>
+            </a:xfrm>
+            <a:prstGeom prst="ellipse">
+              <a:avLst/>
+            </a:prstGeom>
+            <a:solidFill>
+              <a:srgbClr val="CC0000"/>
+            </a:solidFill>
+            <a:ln>
+              <a:noFill/>
+            </a:ln>
+          </p:spPr>
+          <p:style>
+            <a:lnRef idx="2">
+              <a:schemeClr val="accent1">
+                <a:shade val="50000"/>
+              </a:schemeClr>
+            </a:lnRef>
+            <a:fillRef idx="1">
+              <a:schemeClr val="accent1"/>
+            </a:fillRef>
+            <a:effectRef idx="0">
+              <a:schemeClr val="accent1"/>
+            </a:effectRef>
+            <a:fontRef idx="minor">
+              <a:schemeClr val="lt1"/>
+            </a:fontRef>
+          </p:style>
+          <p:txBody>
+            <a:bodyPr rtlCol="0" anchor="ctr"/>
+            <a:lstStyle/>
+            <a:p>
+              <a:pPr algn="ctr"/>
+              <a:endParaRPr lang="ko-KR" altLang="en-US"/>
+            </a:p>
+          </p:txBody>
+        </p:sp>
+        <p:sp>
+          <p:nvSpPr>
+            <p:cNvPr id="22" name="TextBox 21">
+              <a:extLst>
+                <a:ext uri="{FF2B5EF4-FFF2-40B4-BE49-F238E27FC236}">
+                  <a16:creationId xmlns:a16="http://schemas.microsoft.com/office/drawing/2014/main" id="{09DBA662-893E-4BF1-A5AF-E9D10AEF4DE4}"/>
+                </a:ext>
+              </a:extLst>
+            </p:cNvPr>
+            <p:cNvSpPr txBox="1"/>
+            <p:nvPr/>
+          </p:nvSpPr>
+          <p:spPr>
+            <a:xfrm>
+              <a:off x="1002846" y="1414929"/>
+              <a:ext cx="2364058" cy="1743207"/>
+            </a:xfrm>
+            <a:prstGeom prst="rect">
+              <a:avLst/>
+            </a:prstGeom>
+            <a:noFill/>
+          </p:spPr>
+          <p:txBody>
+            <a:bodyPr wrap="square" rtlCol="0">
+              <a:spAutoFit/>
+            </a:bodyPr>
+            <a:lstStyle/>
+            <a:p>
+              <a:r>
+                <a:rPr lang="en-US" altLang="ko-KR" sz="2000" b="1" dirty="0">
+                  <a:solidFill>
+                    <a:schemeClr val="bg1"/>
+                  </a:solidFill>
+                  <a:latin typeface="넥슨 풋볼고딕 B" panose="020B0803000000000000" pitchFamily="50" charset="-127"/>
+                  <a:ea typeface="넥슨 풋볼고딕 B" panose="020B0803000000000000" pitchFamily="50" charset="-127"/>
+                </a:rPr>
+                <a:t>19</a:t>
+              </a:r>
+              <a:endParaRPr lang="ko-KR" altLang="en-US" sz="2000" b="1" dirty="0">
+                <a:solidFill>
+                  <a:schemeClr val="bg1"/>
+                </a:solidFill>
+                <a:latin typeface="넥슨 풋볼고딕 B" panose="020B0803000000000000" pitchFamily="50" charset="-127"/>
+                <a:ea typeface="넥슨 풋볼고딕 B" panose="020B0803000000000000" pitchFamily="50" charset="-127"/>
+              </a:endParaRPr>
+            </a:p>
+          </p:txBody>
+        </p:sp>
+      </p:grpSp>
+      <p:grpSp>
+        <p:nvGrpSpPr>
+          <p:cNvPr id="23" name="그룹 22">
+            <a:extLst>
+              <a:ext uri="{FF2B5EF4-FFF2-40B4-BE49-F238E27FC236}">
+                <a16:creationId xmlns:a16="http://schemas.microsoft.com/office/drawing/2014/main" id="{BBA20E59-1A7F-4E1C-9163-72D03DBBC8FF}"/>
+              </a:ext>
+            </a:extLst>
+          </p:cNvPr>
+          <p:cNvGrpSpPr/>
+          <p:nvPr/>
+        </p:nvGrpSpPr>
+        <p:grpSpPr>
+          <a:xfrm>
+            <a:off x="1291312" y="2185000"/>
+            <a:ext cx="565471" cy="542611"/>
+            <a:chOff x="903249" y="1003610"/>
+            <a:chExt cx="2463655" cy="2364058"/>
+          </a:xfrm>
+        </p:grpSpPr>
+        <p:sp>
+          <p:nvSpPr>
+            <p:cNvPr id="24" name="타원 23">
+              <a:extLst>
+                <a:ext uri="{FF2B5EF4-FFF2-40B4-BE49-F238E27FC236}">
+                  <a16:creationId xmlns:a16="http://schemas.microsoft.com/office/drawing/2014/main" id="{FB110357-4DF7-49D3-803E-9F05455E4306}"/>
+                </a:ext>
+              </a:extLst>
+            </p:cNvPr>
+            <p:cNvSpPr/>
+            <p:nvPr/>
+          </p:nvSpPr>
+          <p:spPr>
+            <a:xfrm>
+              <a:off x="903249" y="1003610"/>
+              <a:ext cx="2364058" cy="2364058"/>
+            </a:xfrm>
+            <a:prstGeom prst="ellipse">
+              <a:avLst/>
+            </a:prstGeom>
+            <a:solidFill>
+              <a:srgbClr val="F4A310"/>
+            </a:solidFill>
+            <a:ln>
+              <a:noFill/>
+            </a:ln>
+          </p:spPr>
+          <p:style>
+            <a:lnRef idx="2">
+              <a:schemeClr val="accent1">
+                <a:shade val="50000"/>
+              </a:schemeClr>
+            </a:lnRef>
+            <a:fillRef idx="1">
+              <a:schemeClr val="accent1"/>
+            </a:fillRef>
+            <a:effectRef idx="0">
+              <a:schemeClr val="accent1"/>
+            </a:effectRef>
+            <a:fontRef idx="minor">
+              <a:schemeClr val="lt1"/>
+            </a:fontRef>
+          </p:style>
+          <p:txBody>
+            <a:bodyPr rtlCol="0" anchor="ctr"/>
+            <a:lstStyle/>
+            <a:p>
+              <a:pPr algn="ctr"/>
+              <a:endParaRPr lang="ko-KR" altLang="en-US"/>
+            </a:p>
+          </p:txBody>
+        </p:sp>
+        <p:sp>
+          <p:nvSpPr>
+            <p:cNvPr id="25" name="TextBox 24">
+              <a:extLst>
+                <a:ext uri="{FF2B5EF4-FFF2-40B4-BE49-F238E27FC236}">
+                  <a16:creationId xmlns:a16="http://schemas.microsoft.com/office/drawing/2014/main" id="{1CCFBC26-E6CD-4523-A4A9-A69333FD861E}"/>
+                </a:ext>
+              </a:extLst>
+            </p:cNvPr>
+            <p:cNvSpPr txBox="1"/>
+            <p:nvPr/>
+          </p:nvSpPr>
+          <p:spPr>
+            <a:xfrm>
+              <a:off x="1002846" y="1414929"/>
+              <a:ext cx="2364058" cy="1743207"/>
+            </a:xfrm>
+            <a:prstGeom prst="rect">
+              <a:avLst/>
+            </a:prstGeom>
+            <a:noFill/>
+          </p:spPr>
+          <p:txBody>
+            <a:bodyPr wrap="square" rtlCol="0">
+              <a:spAutoFit/>
+            </a:bodyPr>
+            <a:lstStyle/>
+            <a:p>
+              <a:r>
+                <a:rPr lang="en-US" altLang="ko-KR" sz="2000" b="1" dirty="0">
+                  <a:solidFill>
+                    <a:schemeClr val="bg1"/>
+                  </a:solidFill>
+                  <a:latin typeface="넥슨 풋볼고딕 B" panose="020B0803000000000000" pitchFamily="50" charset="-127"/>
+                  <a:ea typeface="넥슨 풋볼고딕 B" panose="020B0803000000000000" pitchFamily="50" charset="-127"/>
+                </a:rPr>
+                <a:t>15</a:t>
+              </a:r>
+              <a:endParaRPr lang="ko-KR" altLang="en-US" sz="2000" b="1" dirty="0">
+                <a:solidFill>
+                  <a:schemeClr val="bg1"/>
+                </a:solidFill>
+                <a:latin typeface="넥슨 풋볼고딕 B" panose="020B0803000000000000" pitchFamily="50" charset="-127"/>
+                <a:ea typeface="넥슨 풋볼고딕 B" panose="020B0803000000000000" pitchFamily="50" charset="-127"/>
+              </a:endParaRPr>
+            </a:p>
+          </p:txBody>
+        </p:sp>
+      </p:grpSp>
+    </p:spTree>
+    <p:extLst>
+      <p:ext uri="{BB962C8B-B14F-4D97-AF65-F5344CB8AC3E}">
+        <p14:creationId xmlns:p14="http://schemas.microsoft.com/office/powerpoint/2010/main" val="2507915518"/>
+      </p:ext>
+    </p:extLst>
+  </p:cSld>
+  <p:clrMapOvr>
+    <a:masterClrMapping/>
+  </p:clrMapOvr>
+</p:sld>
+</file>
+
 <file path=ppt/theme/theme1.xml><?xml version="1.0" encoding="utf-8"?>
 <a:theme xmlns:a="http://schemas.openxmlformats.org/drawingml/2006/main" name="Office 테마">
   <a:themeElements>

</xml_diff>